<commit_message>
New Quest, Unlock customization features when collecting coins
</commit_message>
<xml_diff>
--- a/images/lectures.pptx
+++ b/images/lectures.pptx
@@ -110,6 +110,11 @@
       </a:defRPr>
     </a:lvl9pPr>
   </p:defaultTextStyle>
+  <p:extLst>
+    <p:ext uri="{EFAFB233-063F-42B5-8137-9DF3F51BA10A}">
+      <p15:sldGuideLst xmlns:p15="http://schemas.microsoft.com/office/powerpoint/2012/main"/>
+    </p:ext>
+  </p:extLst>
 </p:presentation>
 </file>
 
@@ -262,7 +267,7 @@
           <a:p>
             <a:fld id="{03B4DD1B-372C-409B-99F7-0090B585E0E5}" type="datetimeFigureOut">
               <a:rPr lang="de-AT" smtClean="0"/>
-              <a:t>31.08.2022</a:t>
+              <a:t>19.09.2022</a:t>
             </a:fld>
             <a:endParaRPr lang="de-AT"/>
           </a:p>
@@ -462,7 +467,7 @@
           <a:p>
             <a:fld id="{03B4DD1B-372C-409B-99F7-0090B585E0E5}" type="datetimeFigureOut">
               <a:rPr lang="de-AT" smtClean="0"/>
-              <a:t>31.08.2022</a:t>
+              <a:t>19.09.2022</a:t>
             </a:fld>
             <a:endParaRPr lang="de-AT"/>
           </a:p>
@@ -672,7 +677,7 @@
           <a:p>
             <a:fld id="{03B4DD1B-372C-409B-99F7-0090B585E0E5}" type="datetimeFigureOut">
               <a:rPr lang="de-AT" smtClean="0"/>
-              <a:t>31.08.2022</a:t>
+              <a:t>19.09.2022</a:t>
             </a:fld>
             <a:endParaRPr lang="de-AT"/>
           </a:p>
@@ -872,7 +877,7 @@
           <a:p>
             <a:fld id="{03B4DD1B-372C-409B-99F7-0090B585E0E5}" type="datetimeFigureOut">
               <a:rPr lang="de-AT" smtClean="0"/>
-              <a:t>31.08.2022</a:t>
+              <a:t>19.09.2022</a:t>
             </a:fld>
             <a:endParaRPr lang="de-AT"/>
           </a:p>
@@ -1148,7 +1153,7 @@
           <a:p>
             <a:fld id="{03B4DD1B-372C-409B-99F7-0090B585E0E5}" type="datetimeFigureOut">
               <a:rPr lang="de-AT" smtClean="0"/>
-              <a:t>31.08.2022</a:t>
+              <a:t>19.09.2022</a:t>
             </a:fld>
             <a:endParaRPr lang="de-AT"/>
           </a:p>
@@ -1416,7 +1421,7 @@
           <a:p>
             <a:fld id="{03B4DD1B-372C-409B-99F7-0090B585E0E5}" type="datetimeFigureOut">
               <a:rPr lang="de-AT" smtClean="0"/>
-              <a:t>31.08.2022</a:t>
+              <a:t>19.09.2022</a:t>
             </a:fld>
             <a:endParaRPr lang="de-AT"/>
           </a:p>
@@ -1831,7 +1836,7 @@
           <a:p>
             <a:fld id="{03B4DD1B-372C-409B-99F7-0090B585E0E5}" type="datetimeFigureOut">
               <a:rPr lang="de-AT" smtClean="0"/>
-              <a:t>31.08.2022</a:t>
+              <a:t>19.09.2022</a:t>
             </a:fld>
             <a:endParaRPr lang="de-AT"/>
           </a:p>
@@ -1973,7 +1978,7 @@
           <a:p>
             <a:fld id="{03B4DD1B-372C-409B-99F7-0090B585E0E5}" type="datetimeFigureOut">
               <a:rPr lang="de-AT" smtClean="0"/>
-              <a:t>31.08.2022</a:t>
+              <a:t>19.09.2022</a:t>
             </a:fld>
             <a:endParaRPr lang="de-AT"/>
           </a:p>
@@ -2086,7 +2091,7 @@
           <a:p>
             <a:fld id="{03B4DD1B-372C-409B-99F7-0090B585E0E5}" type="datetimeFigureOut">
               <a:rPr lang="de-AT" smtClean="0"/>
-              <a:t>31.08.2022</a:t>
+              <a:t>19.09.2022</a:t>
             </a:fld>
             <a:endParaRPr lang="de-AT"/>
           </a:p>
@@ -2399,7 +2404,7 @@
           <a:p>
             <a:fld id="{03B4DD1B-372C-409B-99F7-0090B585E0E5}" type="datetimeFigureOut">
               <a:rPr lang="de-AT" smtClean="0"/>
-              <a:t>31.08.2022</a:t>
+              <a:t>19.09.2022</a:t>
             </a:fld>
             <a:endParaRPr lang="de-AT"/>
           </a:p>
@@ -2688,7 +2693,7 @@
           <a:p>
             <a:fld id="{03B4DD1B-372C-409B-99F7-0090B585E0E5}" type="datetimeFigureOut">
               <a:rPr lang="de-AT" smtClean="0"/>
-              <a:t>31.08.2022</a:t>
+              <a:t>19.09.2022</a:t>
             </a:fld>
             <a:endParaRPr lang="de-AT"/>
           </a:p>
@@ -2931,7 +2936,7 @@
           <a:p>
             <a:fld id="{03B4DD1B-372C-409B-99F7-0090B585E0E5}" type="datetimeFigureOut">
               <a:rPr lang="de-AT" smtClean="0"/>
-              <a:t>31.08.2022</a:t>
+              <a:t>19.09.2022</a:t>
             </a:fld>
             <a:endParaRPr lang="de-AT"/>
           </a:p>
@@ -3987,8 +3992,8 @@
           </a:p>
         </p:txBody>
       </p:sp>
-      <mc:AlternateContent xmlns:mc="http://schemas.openxmlformats.org/markup-compatibility/2006">
-        <mc:Choice xmlns:a14="http://schemas.microsoft.com/office/drawing/2010/main" Requires="a14">
+      <mc:AlternateContent xmlns:mc="http://schemas.openxmlformats.org/markup-compatibility/2006" xmlns:a14="http://schemas.microsoft.com/office/drawing/2010/main">
+        <mc:Choice Requires="a14">
           <p:sp>
             <p:nvSpPr>
               <p:cNvPr id="5" name="Inhaltsplatzhalter 2">
@@ -4455,7 +4460,7 @@
             </p:txBody>
           </p:sp>
         </mc:Choice>
-        <mc:Fallback>
+        <mc:Fallback xmlns="">
           <p:sp>
             <p:nvSpPr>
               <p:cNvPr id="5" name="Inhaltsplatzhalter 2">
@@ -5088,7 +5093,7 @@
         </p:nvSpPr>
         <p:spPr>
           <a:xfrm>
-            <a:off x="2886254" y="0"/>
+            <a:off x="2886250" y="-35162"/>
             <a:ext cx="6419491" cy="6858000"/>
           </a:xfrm>
           <a:prstGeom prst="rect">
@@ -5128,6 +5133,36 @@
           </a:p>
         </p:txBody>
       </p:sp>
+      <p:pic>
+        <p:nvPicPr>
+          <p:cNvPr id="14" name="Grafik 13">
+            <a:extLst>
+              <a:ext uri="{FF2B5EF4-FFF2-40B4-BE49-F238E27FC236}">
+                <a16:creationId xmlns:a16="http://schemas.microsoft.com/office/drawing/2014/main" id="{16AD517F-8351-4402-BF09-7956173AED26}"/>
+              </a:ext>
+            </a:extLst>
+          </p:cNvPr>
+          <p:cNvPicPr>
+            <a:picLocks noChangeAspect="1"/>
+          </p:cNvPicPr>
+          <p:nvPr/>
+        </p:nvPicPr>
+        <p:blipFill>
+          <a:blip r:embed="rId2"/>
+          <a:stretch>
+            <a:fillRect/>
+          </a:stretch>
+        </p:blipFill>
+        <p:spPr>
+          <a:xfrm>
+            <a:off x="2886242" y="5156705"/>
+            <a:ext cx="6419495" cy="1528467"/>
+          </a:xfrm>
+          <a:prstGeom prst="rect">
+            <a:avLst/>
+          </a:prstGeom>
+        </p:spPr>
+      </p:pic>
       <p:sp>
         <p:nvSpPr>
           <p:cNvPr id="2" name="Titel 1">
@@ -5179,7 +5214,7 @@
           </p:nvPr>
         </p:nvPicPr>
         <p:blipFill>
-          <a:blip r:embed="rId2">
+          <a:blip r:embed="rId3">
             <a:extLst>
               <a:ext uri="{28A0092B-C50C-407E-A947-70E740481C1C}">
                 <a14:useLocalDpi xmlns:a14="http://schemas.microsoft.com/office/drawing/2010/main" val="0"/>
@@ -5192,8 +5227,8 @@
         </p:blipFill>
         <p:spPr>
           <a:xfrm>
-            <a:off x="2886253" y="1477457"/>
-            <a:ext cx="6419491" cy="2178684"/>
+            <a:off x="2886246" y="1517414"/>
+            <a:ext cx="6419491" cy="1528467"/>
           </a:xfrm>
         </p:spPr>
       </p:pic>
@@ -5212,7 +5247,7 @@
           <p:nvPr/>
         </p:nvPicPr>
         <p:blipFill>
-          <a:blip r:embed="rId3">
+          <a:blip r:embed="rId4">
             <a:extLst>
               <a:ext uri="{28A0092B-C50C-407E-A947-70E740481C1C}">
                 <a14:useLocalDpi xmlns:a14="http://schemas.microsoft.com/office/drawing/2010/main" val="0"/>
@@ -5225,14 +5260,158 @@
         </p:blipFill>
         <p:spPr>
           <a:xfrm>
-            <a:off x="2886252" y="4291448"/>
-            <a:ext cx="6419491" cy="2178684"/>
+            <a:off x="2886246" y="3369399"/>
+            <a:ext cx="6419491" cy="1528467"/>
           </a:xfrm>
           <a:prstGeom prst="rect">
             <a:avLst/>
           </a:prstGeom>
         </p:spPr>
       </p:pic>
+      <p:sp>
+        <p:nvSpPr>
+          <p:cNvPr id="5" name="Rechteck 4">
+            <a:extLst>
+              <a:ext uri="{FF2B5EF4-FFF2-40B4-BE49-F238E27FC236}">
+                <a16:creationId xmlns:a16="http://schemas.microsoft.com/office/drawing/2014/main" id="{D70E0B08-BE21-4444-9FD8-08EB073652FB}"/>
+              </a:ext>
+            </a:extLst>
+          </p:cNvPr>
+          <p:cNvSpPr/>
+          <p:nvPr/>
+        </p:nvSpPr>
+        <p:spPr>
+          <a:xfrm>
+            <a:off x="2886242" y="1890407"/>
+            <a:ext cx="393056" cy="584775"/>
+          </a:xfrm>
+          <a:prstGeom prst="rect">
+            <a:avLst/>
+          </a:prstGeom>
+          <a:noFill/>
+        </p:spPr>
+        <p:txBody>
+          <a:bodyPr wrap="none" lIns="91440" tIns="45720" rIns="91440" bIns="45720">
+            <a:spAutoFit/>
+          </a:bodyPr>
+          <a:lstStyle/>
+          <a:p>
+            <a:pPr algn="ctr"/>
+            <a:r>
+              <a:rPr lang="de-DE" sz="3200" b="0" cap="none" spc="0" dirty="0">
+                <a:ln w="0"/>
+                <a:solidFill>
+                  <a:schemeClr val="bg1"/>
+                </a:solidFill>
+                <a:effectLst>
+                  <a:outerShdw blurRad="38100" dist="19050" dir="2700000" algn="tl" rotWithShape="0">
+                    <a:schemeClr val="dk1">
+                      <a:alpha val="40000"/>
+                    </a:schemeClr>
+                  </a:outerShdw>
+                </a:effectLst>
+              </a:rPr>
+              <a:t>1</a:t>
+            </a:r>
+          </a:p>
+        </p:txBody>
+      </p:sp>
+      <p:sp>
+        <p:nvSpPr>
+          <p:cNvPr id="11" name="Rechteck 10">
+            <a:extLst>
+              <a:ext uri="{FF2B5EF4-FFF2-40B4-BE49-F238E27FC236}">
+                <a16:creationId xmlns:a16="http://schemas.microsoft.com/office/drawing/2014/main" id="{CF9390D0-C506-4C3E-872E-E3AF6E1ED40E}"/>
+              </a:ext>
+            </a:extLst>
+          </p:cNvPr>
+          <p:cNvSpPr/>
+          <p:nvPr/>
+        </p:nvSpPr>
+        <p:spPr>
+          <a:xfrm>
+            <a:off x="2886242" y="3781362"/>
+            <a:ext cx="393056" cy="584775"/>
+          </a:xfrm>
+          <a:prstGeom prst="rect">
+            <a:avLst/>
+          </a:prstGeom>
+          <a:noFill/>
+        </p:spPr>
+        <p:txBody>
+          <a:bodyPr wrap="none" lIns="91440" tIns="45720" rIns="91440" bIns="45720">
+            <a:spAutoFit/>
+          </a:bodyPr>
+          <a:lstStyle/>
+          <a:p>
+            <a:pPr algn="ctr"/>
+            <a:r>
+              <a:rPr lang="de-DE" sz="3200" b="0" cap="none" spc="0" dirty="0">
+                <a:ln w="0"/>
+                <a:solidFill>
+                  <a:schemeClr val="bg1"/>
+                </a:solidFill>
+                <a:effectLst>
+                  <a:outerShdw blurRad="38100" dist="19050" dir="2700000" algn="tl" rotWithShape="0">
+                    <a:schemeClr val="dk1">
+                      <a:alpha val="40000"/>
+                    </a:schemeClr>
+                  </a:outerShdw>
+                </a:effectLst>
+              </a:rPr>
+              <a:t>2</a:t>
+            </a:r>
+          </a:p>
+        </p:txBody>
+      </p:sp>
+      <p:sp>
+        <p:nvSpPr>
+          <p:cNvPr id="12" name="Rechteck 11">
+            <a:extLst>
+              <a:ext uri="{FF2B5EF4-FFF2-40B4-BE49-F238E27FC236}">
+                <a16:creationId xmlns:a16="http://schemas.microsoft.com/office/drawing/2014/main" id="{26F6C7A9-1BA2-4227-8F00-C4237D449847}"/>
+              </a:ext>
+            </a:extLst>
+          </p:cNvPr>
+          <p:cNvSpPr/>
+          <p:nvPr/>
+        </p:nvSpPr>
+        <p:spPr>
+          <a:xfrm>
+            <a:off x="2886242" y="5619271"/>
+            <a:ext cx="393056" cy="584775"/>
+          </a:xfrm>
+          <a:prstGeom prst="rect">
+            <a:avLst/>
+          </a:prstGeom>
+          <a:noFill/>
+        </p:spPr>
+        <p:txBody>
+          <a:bodyPr wrap="none" lIns="91440" tIns="45720" rIns="91440" bIns="45720">
+            <a:spAutoFit/>
+          </a:bodyPr>
+          <a:lstStyle/>
+          <a:p>
+            <a:pPr algn="ctr"/>
+            <a:r>
+              <a:rPr lang="de-DE" sz="3200" b="0" cap="none" spc="0" dirty="0">
+                <a:ln w="0"/>
+                <a:solidFill>
+                  <a:schemeClr val="bg1"/>
+                </a:solidFill>
+                <a:effectLst>
+                  <a:outerShdw blurRad="38100" dist="19050" dir="2700000" algn="tl" rotWithShape="0">
+                    <a:schemeClr val="dk1">
+                      <a:alpha val="40000"/>
+                    </a:schemeClr>
+                  </a:outerShdw>
+                </a:effectLst>
+              </a:rPr>
+              <a:t>3</a:t>
+            </a:r>
+          </a:p>
+        </p:txBody>
+      </p:sp>
     </p:spTree>
     <p:extLst>
       <p:ext uri="{BB962C8B-B14F-4D97-AF65-F5344CB8AC3E}">

</xml_diff>